<commit_message>
Progress on Interface Redesign
 - frameless interface
 - empty user guide
 - included logo
 - organised project
</commit_message>
<xml_diff>
--- a/images.pptx
+++ b/images.pptx
@@ -262,7 +262,7 @@
           <a:p>
             <a:fld id="{17438BC1-AAC3-47D3-B2BD-C0A3E8141807}" type="datetimeFigureOut">
               <a:rPr lang="de-CH" smtClean="0"/>
-              <a:t>24.06.2022</a:t>
+              <a:t>30.06.2022</a:t>
             </a:fld>
             <a:endParaRPr lang="de-CH"/>
           </a:p>
@@ -462,7 +462,7 @@
           <a:p>
             <a:fld id="{17438BC1-AAC3-47D3-B2BD-C0A3E8141807}" type="datetimeFigureOut">
               <a:rPr lang="de-CH" smtClean="0"/>
-              <a:t>24.06.2022</a:t>
+              <a:t>30.06.2022</a:t>
             </a:fld>
             <a:endParaRPr lang="de-CH"/>
           </a:p>
@@ -672,7 +672,7 @@
           <a:p>
             <a:fld id="{17438BC1-AAC3-47D3-B2BD-C0A3E8141807}" type="datetimeFigureOut">
               <a:rPr lang="de-CH" smtClean="0"/>
-              <a:t>24.06.2022</a:t>
+              <a:t>30.06.2022</a:t>
             </a:fld>
             <a:endParaRPr lang="de-CH"/>
           </a:p>
@@ -872,7 +872,7 @@
           <a:p>
             <a:fld id="{17438BC1-AAC3-47D3-B2BD-C0A3E8141807}" type="datetimeFigureOut">
               <a:rPr lang="de-CH" smtClean="0"/>
-              <a:t>24.06.2022</a:t>
+              <a:t>30.06.2022</a:t>
             </a:fld>
             <a:endParaRPr lang="de-CH"/>
           </a:p>
@@ -1148,7 +1148,7 @@
           <a:p>
             <a:fld id="{17438BC1-AAC3-47D3-B2BD-C0A3E8141807}" type="datetimeFigureOut">
               <a:rPr lang="de-CH" smtClean="0"/>
-              <a:t>24.06.2022</a:t>
+              <a:t>30.06.2022</a:t>
             </a:fld>
             <a:endParaRPr lang="de-CH"/>
           </a:p>
@@ -1416,7 +1416,7 @@
           <a:p>
             <a:fld id="{17438BC1-AAC3-47D3-B2BD-C0A3E8141807}" type="datetimeFigureOut">
               <a:rPr lang="de-CH" smtClean="0"/>
-              <a:t>24.06.2022</a:t>
+              <a:t>30.06.2022</a:t>
             </a:fld>
             <a:endParaRPr lang="de-CH"/>
           </a:p>
@@ -1831,7 +1831,7 @@
           <a:p>
             <a:fld id="{17438BC1-AAC3-47D3-B2BD-C0A3E8141807}" type="datetimeFigureOut">
               <a:rPr lang="de-CH" smtClean="0"/>
-              <a:t>24.06.2022</a:t>
+              <a:t>30.06.2022</a:t>
             </a:fld>
             <a:endParaRPr lang="de-CH"/>
           </a:p>
@@ -1973,7 +1973,7 @@
           <a:p>
             <a:fld id="{17438BC1-AAC3-47D3-B2BD-C0A3E8141807}" type="datetimeFigureOut">
               <a:rPr lang="de-CH" smtClean="0"/>
-              <a:t>24.06.2022</a:t>
+              <a:t>30.06.2022</a:t>
             </a:fld>
             <a:endParaRPr lang="de-CH"/>
           </a:p>
@@ -2086,7 +2086,7 @@
           <a:p>
             <a:fld id="{17438BC1-AAC3-47D3-B2BD-C0A3E8141807}" type="datetimeFigureOut">
               <a:rPr lang="de-CH" smtClean="0"/>
-              <a:t>24.06.2022</a:t>
+              <a:t>30.06.2022</a:t>
             </a:fld>
             <a:endParaRPr lang="de-CH"/>
           </a:p>
@@ -2399,7 +2399,7 @@
           <a:p>
             <a:fld id="{17438BC1-AAC3-47D3-B2BD-C0A3E8141807}" type="datetimeFigureOut">
               <a:rPr lang="de-CH" smtClean="0"/>
-              <a:t>24.06.2022</a:t>
+              <a:t>30.06.2022</a:t>
             </a:fld>
             <a:endParaRPr lang="de-CH"/>
           </a:p>
@@ -2688,7 +2688,7 @@
           <a:p>
             <a:fld id="{17438BC1-AAC3-47D3-B2BD-C0A3E8141807}" type="datetimeFigureOut">
               <a:rPr lang="de-CH" smtClean="0"/>
-              <a:t>24.06.2022</a:t>
+              <a:t>30.06.2022</a:t>
             </a:fld>
             <a:endParaRPr lang="de-CH"/>
           </a:p>
@@ -2931,7 +2931,7 @@
           <a:p>
             <a:fld id="{17438BC1-AAC3-47D3-B2BD-C0A3E8141807}" type="datetimeFigureOut">
               <a:rPr lang="de-CH" smtClean="0"/>
-              <a:t>24.06.2022</a:t>
+              <a:t>30.06.2022</a:t>
             </a:fld>
             <a:endParaRPr lang="de-CH"/>
           </a:p>

</xml_diff>